<commit_message>
Level 1 Physics Complete.
Level 1's Physical Properties Developed, Working on improved Graphics.
</commit_message>
<xml_diff>
--- a/Used Resorces (Temporary Folder or Non Major Folder)/PowerPoint/level1.pptx
+++ b/Used Resorces (Temporary Folder or Non Major Folder)/PowerPoint/level1.pptx
@@ -270,7 +270,7 @@
           <a:p>
             <a:fld id="{4E97F38F-9E87-4333-91F8-0CF5B220D2B4}" type="datetimeFigureOut">
               <a:rPr lang="en-US" smtClean="0"/>
-              <a:t>9/18/2020</a:t>
+              <a:t>9/24/2020</a:t>
             </a:fld>
             <a:endParaRPr lang="en-US"/>
           </a:p>
@@ -468,7 +468,7 @@
           <a:p>
             <a:fld id="{4E97F38F-9E87-4333-91F8-0CF5B220D2B4}" type="datetimeFigureOut">
               <a:rPr lang="en-US" smtClean="0"/>
-              <a:t>9/18/2020</a:t>
+              <a:t>9/24/2020</a:t>
             </a:fld>
             <a:endParaRPr lang="en-US"/>
           </a:p>
@@ -676,7 +676,7 @@
           <a:p>
             <a:fld id="{4E97F38F-9E87-4333-91F8-0CF5B220D2B4}" type="datetimeFigureOut">
               <a:rPr lang="en-US" smtClean="0"/>
-              <a:t>9/18/2020</a:t>
+              <a:t>9/24/2020</a:t>
             </a:fld>
             <a:endParaRPr lang="en-US"/>
           </a:p>
@@ -874,7 +874,7 @@
           <a:p>
             <a:fld id="{4E97F38F-9E87-4333-91F8-0CF5B220D2B4}" type="datetimeFigureOut">
               <a:rPr lang="en-US" smtClean="0"/>
-              <a:t>9/18/2020</a:t>
+              <a:t>9/24/2020</a:t>
             </a:fld>
             <a:endParaRPr lang="en-US"/>
           </a:p>
@@ -1149,7 +1149,7 @@
           <a:p>
             <a:fld id="{4E97F38F-9E87-4333-91F8-0CF5B220D2B4}" type="datetimeFigureOut">
               <a:rPr lang="en-US" smtClean="0"/>
-              <a:t>9/18/2020</a:t>
+              <a:t>9/24/2020</a:t>
             </a:fld>
             <a:endParaRPr lang="en-US"/>
           </a:p>
@@ -1414,7 +1414,7 @@
           <a:p>
             <a:fld id="{4E97F38F-9E87-4333-91F8-0CF5B220D2B4}" type="datetimeFigureOut">
               <a:rPr lang="en-US" smtClean="0"/>
-              <a:t>9/18/2020</a:t>
+              <a:t>9/24/2020</a:t>
             </a:fld>
             <a:endParaRPr lang="en-US"/>
           </a:p>
@@ -1826,7 +1826,7 @@
           <a:p>
             <a:fld id="{4E97F38F-9E87-4333-91F8-0CF5B220D2B4}" type="datetimeFigureOut">
               <a:rPr lang="en-US" smtClean="0"/>
-              <a:t>9/18/2020</a:t>
+              <a:t>9/24/2020</a:t>
             </a:fld>
             <a:endParaRPr lang="en-US"/>
           </a:p>
@@ -1967,7 +1967,7 @@
           <a:p>
             <a:fld id="{4E97F38F-9E87-4333-91F8-0CF5B220D2B4}" type="datetimeFigureOut">
               <a:rPr lang="en-US" smtClean="0"/>
-              <a:t>9/18/2020</a:t>
+              <a:t>9/24/2020</a:t>
             </a:fld>
             <a:endParaRPr lang="en-US"/>
           </a:p>
@@ -2080,7 +2080,7 @@
           <a:p>
             <a:fld id="{4E97F38F-9E87-4333-91F8-0CF5B220D2B4}" type="datetimeFigureOut">
               <a:rPr lang="en-US" smtClean="0"/>
-              <a:t>9/18/2020</a:t>
+              <a:t>9/24/2020</a:t>
             </a:fld>
             <a:endParaRPr lang="en-US"/>
           </a:p>
@@ -2391,7 +2391,7 @@
           <a:p>
             <a:fld id="{4E97F38F-9E87-4333-91F8-0CF5B220D2B4}" type="datetimeFigureOut">
               <a:rPr lang="en-US" smtClean="0"/>
-              <a:t>9/18/2020</a:t>
+              <a:t>9/24/2020</a:t>
             </a:fld>
             <a:endParaRPr lang="en-US"/>
           </a:p>
@@ -2679,7 +2679,7 @@
           <a:p>
             <a:fld id="{4E97F38F-9E87-4333-91F8-0CF5B220D2B4}" type="datetimeFigureOut">
               <a:rPr lang="en-US" smtClean="0"/>
-              <a:t>9/18/2020</a:t>
+              <a:t>9/24/2020</a:t>
             </a:fld>
             <a:endParaRPr lang="en-US"/>
           </a:p>
@@ -2920,7 +2920,7 @@
           <a:p>
             <a:fld id="{4E97F38F-9E87-4333-91F8-0CF5B220D2B4}" type="datetimeFigureOut">
               <a:rPr lang="en-US" smtClean="0"/>
-              <a:t>9/18/2020</a:t>
+              <a:t>9/24/2020</a:t>
             </a:fld>
             <a:endParaRPr lang="en-US"/>
           </a:p>
@@ -4377,50 +4377,6 @@
           </a:p>
         </p:txBody>
       </p:sp>
-      <p:pic>
-        <p:nvPicPr>
-          <p:cNvPr id="33" name="Picture 32">
-            <a:extLst>
-              <a:ext uri="{FF2B5EF4-FFF2-40B4-BE49-F238E27FC236}">
-                <a16:creationId xmlns:a16="http://schemas.microsoft.com/office/drawing/2014/main" id="{45A11252-A706-4370-8741-BFC3C7C3F3B3}"/>
-              </a:ext>
-            </a:extLst>
-          </p:cNvPr>
-          <p:cNvPicPr>
-            <a:picLocks noChangeAspect="1"/>
-          </p:cNvPicPr>
-          <p:nvPr/>
-        </p:nvPicPr>
-        <p:blipFill>
-          <a:blip r:embed="rId4">
-            <a:extLst>
-              <a:ext uri="{28A0092B-C50C-407E-A947-70E740481C1C}">
-                <a14:useLocalDpi xmlns:a14="http://schemas.microsoft.com/office/drawing/2010/main" val="0"/>
-              </a:ext>
-            </a:extLst>
-          </a:blip>
-          <a:stretch>
-            <a:fillRect/>
-          </a:stretch>
-        </p:blipFill>
-        <p:spPr>
-          <a:xfrm>
-            <a:off x="10715127" y="2018209"/>
-            <a:ext cx="690644" cy="910101"/>
-          </a:xfrm>
-          <a:prstGeom prst="rect">
-            <a:avLst/>
-          </a:prstGeom>
-          <a:effectLst>
-            <a:glow rad="228600">
-              <a:schemeClr val="accent4">
-                <a:satMod val="175000"/>
-                <a:alpha val="40000"/>
-              </a:schemeClr>
-            </a:glow>
-          </a:effectLst>
-        </p:spPr>
-      </p:pic>
       <p:sp>
         <p:nvSpPr>
           <p:cNvPr id="34" name="TextBox 33">
@@ -4686,7 +4642,7 @@
           <p:nvPr/>
         </p:nvPicPr>
         <p:blipFill>
-          <a:blip r:embed="rId5">
+          <a:blip r:embed="rId4">
             <a:extLst>
               <a:ext uri="{28A0092B-C50C-407E-A947-70E740481C1C}">
                 <a14:useLocalDpi xmlns:a14="http://schemas.microsoft.com/office/drawing/2010/main" val="0"/>
@@ -4730,7 +4686,7 @@
           <p:nvPr/>
         </p:nvPicPr>
         <p:blipFill>
-          <a:blip r:embed="rId6">
+          <a:blip r:embed="rId5">
             <a:extLst>
               <a:ext uri="{28A0092B-C50C-407E-A947-70E740481C1C}">
                 <a14:useLocalDpi xmlns:a14="http://schemas.microsoft.com/office/drawing/2010/main" val="0"/>
@@ -4774,7 +4730,7 @@
           <p:nvPr/>
         </p:nvPicPr>
         <p:blipFill>
-          <a:blip r:embed="rId7">
+          <a:blip r:embed="rId6">
             <a:extLst>
               <a:ext uri="{28A0092B-C50C-407E-A947-70E740481C1C}">
                 <a14:useLocalDpi xmlns:a14="http://schemas.microsoft.com/office/drawing/2010/main" val="0"/>
@@ -5063,6 +5019,50 @@
           </a:p>
         </p:txBody>
       </p:sp>
+      <p:pic>
+        <p:nvPicPr>
+          <p:cNvPr id="13" name="Picture 12">
+            <a:extLst>
+              <a:ext uri="{FF2B5EF4-FFF2-40B4-BE49-F238E27FC236}">
+                <a16:creationId xmlns:a16="http://schemas.microsoft.com/office/drawing/2014/main" id="{191A87DB-92F1-42F1-8325-0FB1B3003777}"/>
+              </a:ext>
+            </a:extLst>
+          </p:cNvPr>
+          <p:cNvPicPr>
+            <a:picLocks noChangeAspect="1"/>
+          </p:cNvPicPr>
+          <p:nvPr/>
+        </p:nvPicPr>
+        <p:blipFill>
+          <a:blip r:embed="rId7">
+            <a:extLst>
+              <a:ext uri="{28A0092B-C50C-407E-A947-70E740481C1C}">
+                <a14:useLocalDpi xmlns:a14="http://schemas.microsoft.com/office/drawing/2010/main" val="0"/>
+              </a:ext>
+            </a:extLst>
+          </a:blip>
+          <a:stretch>
+            <a:fillRect/>
+          </a:stretch>
+        </p:blipFill>
+        <p:spPr>
+          <a:xfrm>
+            <a:off x="10567077" y="1800287"/>
+            <a:ext cx="1157606" cy="1369248"/>
+          </a:xfrm>
+          <a:prstGeom prst="rect">
+            <a:avLst/>
+          </a:prstGeom>
+          <a:effectLst>
+            <a:glow rad="228600">
+              <a:schemeClr val="accent4">
+                <a:satMod val="175000"/>
+                <a:alpha val="40000"/>
+              </a:schemeClr>
+            </a:glow>
+          </a:effectLst>
+        </p:spPr>
+      </p:pic>
     </p:spTree>
     <p:extLst>
       <p:ext uri="{BB962C8B-B14F-4D97-AF65-F5344CB8AC3E}">

</xml_diff>